<commit_message>
Fix description of linearmag field interpolation. Improve diagram.
</commit_message>
<xml_diff>
--- a/manual/source/dev_figures/linear-mag.pptx
+++ b/manual/source/dev_figures/linear-mag.pptx
@@ -107,6 +107,11 @@
       </a:defRPr>
     </a:lvl9pPr>
   </p:defaultTextStyle>
+  <p:extLst>
+    <p:ext uri="{EFAFB233-063F-42B5-8137-9DF3F51BA10A}">
+      <p15:sldGuideLst xmlns:p15="http://schemas.microsoft.com/office/powerpoint/2012/main"/>
+    </p:ext>
+  </p:extLst>
 </p:presentation>
 </file>
 
@@ -192,7 +197,7 @@
           <a:p>
             <a:fld id="{A792376E-36D0-BA44-A839-82091B35C84C}" type="datetimeFigureOut">
               <a:rPr lang="en-GB" smtClean="0"/>
-              <a:t>22/10/2021</a:t>
+              <a:t>29/05/2022</a:t>
             </a:fld>
             <a:endParaRPr lang="en-GB"/>
           </a:p>
@@ -679,7 +684,7 @@
           <a:p>
             <a:fld id="{5ED5806C-266E-3443-9C88-3C06A943C549}" type="datetimeFigureOut">
               <a:rPr lang="en-GB" smtClean="0"/>
-              <a:t>22/10/2021</a:t>
+              <a:t>29/05/2022</a:t>
             </a:fld>
             <a:endParaRPr lang="en-GB"/>
           </a:p>
@@ -849,7 +854,7 @@
           <a:p>
             <a:fld id="{5ED5806C-266E-3443-9C88-3C06A943C549}" type="datetimeFigureOut">
               <a:rPr lang="en-GB" smtClean="0"/>
-              <a:t>22/10/2021</a:t>
+              <a:t>29/05/2022</a:t>
             </a:fld>
             <a:endParaRPr lang="en-GB"/>
           </a:p>
@@ -1029,7 +1034,7 @@
           <a:p>
             <a:fld id="{5ED5806C-266E-3443-9C88-3C06A943C549}" type="datetimeFigureOut">
               <a:rPr lang="en-GB" smtClean="0"/>
-              <a:t>22/10/2021</a:t>
+              <a:t>29/05/2022</a:t>
             </a:fld>
             <a:endParaRPr lang="en-GB"/>
           </a:p>
@@ -1199,7 +1204,7 @@
           <a:p>
             <a:fld id="{5ED5806C-266E-3443-9C88-3C06A943C549}" type="datetimeFigureOut">
               <a:rPr lang="en-GB" smtClean="0"/>
-              <a:t>22/10/2021</a:t>
+              <a:t>29/05/2022</a:t>
             </a:fld>
             <a:endParaRPr lang="en-GB"/>
           </a:p>
@@ -1445,7 +1450,7 @@
           <a:p>
             <a:fld id="{5ED5806C-266E-3443-9C88-3C06A943C549}" type="datetimeFigureOut">
               <a:rPr lang="en-GB" smtClean="0"/>
-              <a:t>22/10/2021</a:t>
+              <a:t>29/05/2022</a:t>
             </a:fld>
             <a:endParaRPr lang="en-GB"/>
           </a:p>
@@ -1677,7 +1682,7 @@
           <a:p>
             <a:fld id="{5ED5806C-266E-3443-9C88-3C06A943C549}" type="datetimeFigureOut">
               <a:rPr lang="en-GB" smtClean="0"/>
-              <a:t>22/10/2021</a:t>
+              <a:t>29/05/2022</a:t>
             </a:fld>
             <a:endParaRPr lang="en-GB"/>
           </a:p>
@@ -2044,7 +2049,7 @@
           <a:p>
             <a:fld id="{5ED5806C-266E-3443-9C88-3C06A943C549}" type="datetimeFigureOut">
               <a:rPr lang="en-GB" smtClean="0"/>
-              <a:t>22/10/2021</a:t>
+              <a:t>29/05/2022</a:t>
             </a:fld>
             <a:endParaRPr lang="en-GB"/>
           </a:p>
@@ -2162,7 +2167,7 @@
           <a:p>
             <a:fld id="{5ED5806C-266E-3443-9C88-3C06A943C549}" type="datetimeFigureOut">
               <a:rPr lang="en-GB" smtClean="0"/>
-              <a:t>22/10/2021</a:t>
+              <a:t>29/05/2022</a:t>
             </a:fld>
             <a:endParaRPr lang="en-GB"/>
           </a:p>
@@ -2257,7 +2262,7 @@
           <a:p>
             <a:fld id="{5ED5806C-266E-3443-9C88-3C06A943C549}" type="datetimeFigureOut">
               <a:rPr lang="en-GB" smtClean="0"/>
-              <a:t>22/10/2021</a:t>
+              <a:t>29/05/2022</a:t>
             </a:fld>
             <a:endParaRPr lang="en-GB"/>
           </a:p>
@@ -2534,7 +2539,7 @@
           <a:p>
             <a:fld id="{5ED5806C-266E-3443-9C88-3C06A943C549}" type="datetimeFigureOut">
               <a:rPr lang="en-GB" smtClean="0"/>
-              <a:t>22/10/2021</a:t>
+              <a:t>29/05/2022</a:t>
             </a:fld>
             <a:endParaRPr lang="en-GB"/>
           </a:p>
@@ -2791,7 +2796,7 @@
           <a:p>
             <a:fld id="{5ED5806C-266E-3443-9C88-3C06A943C549}" type="datetimeFigureOut">
               <a:rPr lang="en-GB" smtClean="0"/>
-              <a:t>22/10/2021</a:t>
+              <a:t>29/05/2022</a:t>
             </a:fld>
             <a:endParaRPr lang="en-GB"/>
           </a:p>
@@ -3004,7 +3009,7 @@
           <a:p>
             <a:fld id="{5ED5806C-266E-3443-9C88-3C06A943C549}" type="datetimeFigureOut">
               <a:rPr lang="en-GB" smtClean="0"/>
-              <a:t>22/10/2021</a:t>
+              <a:t>29/05/2022</a:t>
             </a:fld>
             <a:endParaRPr lang="en-GB"/>
           </a:p>
@@ -3423,10 +3428,10 @@
         </p:nvGrpSpPr>
         <p:grpSpPr>
           <a:xfrm>
-            <a:off x="73741" y="234035"/>
-            <a:ext cx="8007939" cy="2681118"/>
-            <a:chOff x="283706" y="204350"/>
-            <a:chExt cx="8007939" cy="2681118"/>
+            <a:off x="73741" y="127061"/>
+            <a:ext cx="8007939" cy="2788092"/>
+            <a:chOff x="283706" y="97376"/>
+            <a:chExt cx="8007939" cy="2788092"/>
           </a:xfrm>
         </p:grpSpPr>
         <p:grpSp>
@@ -3443,10 +3448,10 @@
           </p:nvGrpSpPr>
           <p:grpSpPr>
             <a:xfrm>
-              <a:off x="283706" y="204350"/>
-              <a:ext cx="3856495" cy="2495228"/>
-              <a:chOff x="2239505" y="1833125"/>
-              <a:chExt cx="3856495" cy="2495228"/>
+              <a:off x="283706" y="97376"/>
+              <a:ext cx="3856495" cy="2602202"/>
+              <a:chOff x="2239505" y="1726151"/>
+              <a:chExt cx="3856495" cy="2602202"/>
             </a:xfrm>
           </p:grpSpPr>
           <p:grpSp>
@@ -3641,7 +3646,9 @@
                 <a:lstStyle/>
                 <a:p>
                   <a:pPr algn="ctr"/>
-                  <a:endParaRPr lang="en-GB"/>
+                  <a:endParaRPr lang="en-GB">
+                    <a:latin typeface="Helvetica" pitchFamily="2" charset="0"/>
+                  </a:endParaRPr>
                 </a:p>
               </p:txBody>
             </p:sp>
@@ -3693,7 +3700,9 @@
                 <a:lstStyle/>
                 <a:p>
                   <a:pPr algn="ctr"/>
-                  <a:endParaRPr lang="en-GB"/>
+                  <a:endParaRPr lang="en-GB">
+                    <a:latin typeface="Helvetica" pitchFamily="2" charset="0"/>
+                  </a:endParaRPr>
                 </a:p>
               </p:txBody>
             </p:sp>
@@ -3745,7 +3754,9 @@
                 <a:lstStyle/>
                 <a:p>
                   <a:pPr algn="ctr"/>
-                  <a:endParaRPr lang="en-GB"/>
+                  <a:endParaRPr lang="en-GB">
+                    <a:latin typeface="Helvetica" pitchFamily="2" charset="0"/>
+                  </a:endParaRPr>
                 </a:p>
               </p:txBody>
             </p:sp>
@@ -3984,7 +3995,7 @@
             <p:spPr>
               <a:xfrm>
                 <a:off x="2777924" y="2302812"/>
-                <a:ext cx="572593" cy="307777"/>
+                <a:ext cx="601447" cy="307777"/>
               </a:xfrm>
               <a:prstGeom prst="rect">
                 <a:avLst/>
@@ -3999,7 +4010,7 @@
               <a:p>
                 <a:r>
                   <a:rPr lang="en-GB" sz="1400" dirty="0">
-                    <a:latin typeface="Times" pitchFamily="2" charset="0"/>
+                    <a:latin typeface="Helvetica" pitchFamily="2" charset="0"/>
                   </a:rPr>
                   <a:t>(0, 1)</a:t>
                 </a:r>
@@ -4021,7 +4032,7 @@
             <p:spPr>
               <a:xfrm>
                 <a:off x="5359800" y="3046731"/>
-                <a:ext cx="572593" cy="307777"/>
+                <a:ext cx="601447" cy="307777"/>
               </a:xfrm>
               <a:prstGeom prst="rect">
                 <a:avLst/>
@@ -4036,7 +4047,7 @@
               <a:p>
                 <a:r>
                   <a:rPr lang="en-GB" sz="1400" dirty="0">
-                    <a:latin typeface="Times" pitchFamily="2" charset="0"/>
+                    <a:latin typeface="Helvetica" pitchFamily="2" charset="0"/>
                   </a:rPr>
                   <a:t>(1, 0)</a:t>
                 </a:r>
@@ -4058,7 +4069,7 @@
             <p:spPr>
               <a:xfrm>
                 <a:off x="3609992" y="2440081"/>
-                <a:ext cx="841897" cy="307777"/>
+                <a:ext cx="899605" cy="307777"/>
               </a:xfrm>
               <a:prstGeom prst="rect">
                 <a:avLst/>
@@ -4073,7 +4084,10 @@
               <a:p>
                 <a:r>
                   <a:rPr lang="en-GB" sz="1400" dirty="0">
-                    <a:latin typeface="Times" pitchFamily="2" charset="0"/>
+                    <a:solidFill>
+                      <a:srgbClr val="FF0000"/>
+                    </a:solidFill>
+                    <a:latin typeface="Helvetica" pitchFamily="2" charset="0"/>
                   </a:rPr>
                   <a:t>(0.5, 0.5)</a:t>
                 </a:r>
@@ -4094,8 +4108,8 @@
             </p:nvSpPr>
             <p:spPr>
               <a:xfrm>
-                <a:off x="2888666" y="1834401"/>
-                <a:ext cx="1241045" cy="307777"/>
+                <a:off x="3170657" y="1726151"/>
+                <a:ext cx="1317990" cy="307777"/>
               </a:xfrm>
               <a:prstGeom prst="rect">
                 <a:avLst/>
@@ -4110,7 +4124,10 @@
               <a:p>
                 <a:r>
                   <a:rPr lang="en-GB" sz="1400" dirty="0">
-                    <a:latin typeface="Times" pitchFamily="2" charset="0"/>
+                    <a:solidFill>
+                      <a:schemeClr val="accent3"/>
+                    </a:solidFill>
+                    <a:latin typeface="Helvetica" pitchFamily="2" charset="0"/>
                   </a:rPr>
                   <a:t>Field map grid</a:t>
                 </a:r>
@@ -4246,7 +4263,9 @@
             <a:lstStyle/>
             <a:p>
               <a:pPr algn="ctr"/>
-              <a:endParaRPr lang="en-GB"/>
+              <a:endParaRPr lang="en-GB">
+                <a:latin typeface="Helvetica" pitchFamily="2" charset="0"/>
+              </a:endParaRPr>
             </a:p>
           </p:txBody>
         </p:sp>
@@ -4298,7 +4317,9 @@
             <a:lstStyle/>
             <a:p>
               <a:pPr algn="ctr"/>
-              <a:endParaRPr lang="en-GB"/>
+              <a:endParaRPr lang="en-GB">
+                <a:latin typeface="Helvetica" pitchFamily="2" charset="0"/>
+              </a:endParaRPr>
             </a:p>
           </p:txBody>
         </p:sp>
@@ -4350,7 +4371,9 @@
             <a:lstStyle/>
             <a:p>
               <a:pPr algn="ctr"/>
-              <a:endParaRPr lang="en-GB"/>
+              <a:endParaRPr lang="en-GB">
+                <a:latin typeface="Helvetica" pitchFamily="2" charset="0"/>
+              </a:endParaRPr>
             </a:p>
           </p:txBody>
         </p:sp>
@@ -4413,7 +4436,7 @@
           </p:nvCxnSpPr>
           <p:spPr>
             <a:xfrm flipV="1">
-              <a:off x="4717845" y="204350"/>
+              <a:off x="4970767" y="204350"/>
               <a:ext cx="0" cy="2495228"/>
             </a:xfrm>
             <a:prstGeom prst="line">
@@ -4588,7 +4611,7 @@
           <p:spPr>
             <a:xfrm>
               <a:off x="4973569" y="674039"/>
-              <a:ext cx="572593" cy="307777"/>
+              <a:ext cx="601447" cy="307777"/>
             </a:xfrm>
             <a:prstGeom prst="rect">
               <a:avLst/>
@@ -4603,7 +4626,7 @@
             <a:p>
               <a:r>
                 <a:rPr lang="en-GB" sz="1400" dirty="0">
-                  <a:latin typeface="Times" pitchFamily="2" charset="0"/>
+                  <a:latin typeface="Helvetica" pitchFamily="2" charset="0"/>
                 </a:rPr>
                 <a:t>(0, 1)</a:t>
               </a:r>
@@ -4625,7 +4648,7 @@
           <p:spPr>
             <a:xfrm>
               <a:off x="7555445" y="1417958"/>
-              <a:ext cx="572593" cy="307777"/>
+              <a:ext cx="601447" cy="307777"/>
             </a:xfrm>
             <a:prstGeom prst="rect">
               <a:avLst/>
@@ -4640,7 +4663,7 @@
             <a:p>
               <a:r>
                 <a:rPr lang="en-GB" sz="1400" dirty="0">
-                  <a:latin typeface="Times" pitchFamily="2" charset="0"/>
+                  <a:latin typeface="Helvetica" pitchFamily="2" charset="0"/>
                 </a:rPr>
                 <a:t>(1, 0)</a:t>
               </a:r>
@@ -4661,8 +4684,8 @@
           </p:nvSpPr>
           <p:spPr>
             <a:xfrm>
-              <a:off x="6776328" y="531542"/>
-              <a:ext cx="1200970" cy="307777"/>
+              <a:off x="6727612" y="648554"/>
+              <a:ext cx="1297150" cy="307777"/>
             </a:xfrm>
             <a:prstGeom prst="rect">
               <a:avLst/>
@@ -4677,7 +4700,10 @@
             <a:p>
               <a:r>
                 <a:rPr lang="en-GB" sz="1400" dirty="0">
-                  <a:latin typeface="Times" pitchFamily="2" charset="0"/>
+                  <a:solidFill>
+                    <a:schemeClr val="accent6"/>
+                  </a:solidFill>
+                  <a:latin typeface="Helvetica" pitchFamily="2" charset="0"/>
                 </a:rPr>
                 <a:t>(0.707, 0.707)</a:t>
               </a:r>
@@ -4743,7 +4769,7 @@
           <p:spPr>
             <a:xfrm>
               <a:off x="1415638" y="2577691"/>
-              <a:ext cx="593432" cy="307777"/>
+              <a:ext cx="622286" cy="307777"/>
             </a:xfrm>
             <a:prstGeom prst="rect">
               <a:avLst/>
@@ -4758,7 +4784,7 @@
             <a:p>
               <a:r>
                 <a:rPr lang="en-GB" sz="1400" dirty="0">
-                  <a:latin typeface="Times" pitchFamily="2" charset="0"/>
+                  <a:latin typeface="Helvetica" pitchFamily="2" charset="0"/>
                 </a:rPr>
                 <a:t>linear</a:t>
               </a:r>
@@ -4780,7 +4806,7 @@
           <p:spPr>
             <a:xfrm>
               <a:off x="4979935" y="2577691"/>
-              <a:ext cx="1542410" cy="307777"/>
+              <a:ext cx="1661032" cy="307777"/>
             </a:xfrm>
             <a:prstGeom prst="rect">
               <a:avLst/>
@@ -4795,7 +4821,7 @@
             <a:p>
               <a:r>
                 <a:rPr lang="en-GB" sz="1400" dirty="0">
-                  <a:latin typeface="Times" pitchFamily="2" charset="0"/>
+                  <a:latin typeface="Helvetica" pitchFamily="2" charset="0"/>
                 </a:rPr>
                 <a:t>linear + magnitude</a:t>
               </a:r>
@@ -4803,6 +4829,86 @@
           </p:txBody>
         </p:sp>
       </p:grpSp>
+      <p:sp>
+        <p:nvSpPr>
+          <p:cNvPr id="36" name="TextBox 35">
+            <a:extLst>
+              <a:ext uri="{FF2B5EF4-FFF2-40B4-BE49-F238E27FC236}">
+                <a16:creationId xmlns:a16="http://schemas.microsoft.com/office/drawing/2014/main" id="{FB160717-615D-EC43-BE99-1B3095BF18B1}"/>
+              </a:ext>
+            </a:extLst>
+          </p:cNvPr>
+          <p:cNvSpPr txBox="1"/>
+          <p:nvPr/>
+        </p:nvSpPr>
+        <p:spPr>
+          <a:xfrm>
+            <a:off x="1094620" y="1133974"/>
+            <a:ext cx="938077" cy="253916"/>
+          </a:xfrm>
+          <a:prstGeom prst="rect">
+            <a:avLst/>
+          </a:prstGeom>
+          <a:noFill/>
+        </p:spPr>
+        <p:txBody>
+          <a:bodyPr wrap="none" rtlCol="0">
+            <a:spAutoFit/>
+          </a:bodyPr>
+          <a:lstStyle/>
+          <a:p>
+            <a:r>
+              <a:rPr lang="en-GB" sz="1050" dirty="0">
+                <a:solidFill>
+                  <a:srgbClr val="FF0000"/>
+                </a:solidFill>
+                <a:latin typeface="Helvetica" pitchFamily="2" charset="0"/>
+              </a:rPr>
+              <a:t>mag = 0.707</a:t>
+            </a:r>
+          </a:p>
+        </p:txBody>
+      </p:sp>
+      <p:sp>
+        <p:nvSpPr>
+          <p:cNvPr id="37" name="TextBox 36">
+            <a:extLst>
+              <a:ext uri="{FF2B5EF4-FFF2-40B4-BE49-F238E27FC236}">
+                <a16:creationId xmlns:a16="http://schemas.microsoft.com/office/drawing/2014/main" id="{D803FA89-042F-2045-9FF5-2AB05B7B83CA}"/>
+              </a:ext>
+            </a:extLst>
+          </p:cNvPr>
+          <p:cNvSpPr txBox="1"/>
+          <p:nvPr/>
+        </p:nvSpPr>
+        <p:spPr>
+          <a:xfrm>
+            <a:off x="5535445" y="1002596"/>
+            <a:ext cx="787395" cy="253916"/>
+          </a:xfrm>
+          <a:prstGeom prst="rect">
+            <a:avLst/>
+          </a:prstGeom>
+          <a:noFill/>
+        </p:spPr>
+        <p:txBody>
+          <a:bodyPr wrap="none" rtlCol="0">
+            <a:spAutoFit/>
+          </a:bodyPr>
+          <a:lstStyle/>
+          <a:p>
+            <a:r>
+              <a:rPr lang="en-GB" sz="1050" dirty="0">
+                <a:solidFill>
+                  <a:schemeClr val="accent6"/>
+                </a:solidFill>
+                <a:latin typeface="Helvetica" pitchFamily="2" charset="0"/>
+              </a:rPr>
+              <a:t>mag = 1.0</a:t>
+            </a:r>
+          </a:p>
+        </p:txBody>
+      </p:sp>
     </p:spTree>
     <p:extLst>
       <p:ext uri="{BB962C8B-B14F-4D97-AF65-F5344CB8AC3E}">

</xml_diff>